<commit_message>
final commit for midterm
</commit_message>
<xml_diff>
--- a/Midterm/Midterm Presentation.pptx
+++ b/Midterm/Midterm Presentation.pptx
@@ -232,7 +232,7 @@
           <a:p>
             <a:fld id="{1CA5457B-CDAE-4DEB-AEC8-C82DE2312E37}" type="datetimeFigureOut">
               <a:rPr lang="en-US" smtClean="0"/>
-              <a:t>11/7/2023</a:t>
+              <a:t>11/9/2023</a:t>
             </a:fld>
             <a:endParaRPr lang="en-US" dirty="0"/>
           </a:p>
@@ -409,7 +409,7 @@
           <a:p>
             <a:fld id="{090B78EA-28CE-41D8-9043-90E391E5F567}" type="datetimeFigureOut">
               <a:rPr lang="en-US" noProof="0" smtClean="0"/>
-              <a:t>11/7/2023</a:t>
+              <a:t>11/9/2023</a:t>
             </a:fld>
             <a:endParaRPr lang="en-US" noProof="0" dirty="0"/>
           </a:p>
@@ -25393,7 +25393,7 @@
       </a:lvl9pPr>
     </p:otherStyle>
   </p:txStyles>
-  <p:extLst mod="1">
+  <p:extLst>
     <p:ext uri="{27BBF7A9-308A-43DC-89C8-2F10F3537804}">
       <p15:sldGuideLst xmlns:p15="http://schemas.microsoft.com/office/powerpoint/2012/main">
         <p15:guide id="1" orient="horz" pos="2160" userDrawn="1">
@@ -25633,25 +25633,55 @@
           <a:bodyPr/>
           <a:lstStyle/>
           <a:p>
-            <a:pPr marL="0" indent="0">
-              <a:buNone/>
-            </a:pPr>
             <a:r>
               <a:rPr lang="en-US" sz="2400" dirty="0"/>
-              <a:t>My project is a simple python text game. The player can choose to fight one of the three monsters, and if they beat it, they can select another one to fight. As the player progresses through the different fights, their health and minimum possible attack damage increases, which makes it possible to fight more difficult monsters.</a:t>
+              <a:t>Simple text game.</a:t>
             </a:r>
           </a:p>
           <a:p>
-            <a:pPr marL="0" indent="0">
-              <a:buNone/>
-            </a:pPr>
             <a:r>
               <a:rPr lang="en-US" sz="2400" dirty="0"/>
-              <a:t>This project includes all of the topics that we covered in class and also many more. Some of these include, imports, functions, lists, and for loops.</a:t>
+              <a:t>Randomized attack damage for player and monster.</a:t>
+            </a:r>
+          </a:p>
+          <a:p>
+            <a:r>
+              <a:rPr lang="en-US" sz="2400" dirty="0"/>
+              <a:t>Use of functions, loops, lists, and variables.</a:t>
             </a:r>
           </a:p>
         </p:txBody>
       </p:sp>
+      <p:pic>
+        <p:nvPicPr>
+          <p:cNvPr id="10" name="Picture 9" descr="A blue and yellow snake logo&#10;&#10;Description automatically generated">
+            <a:extLst>
+              <a:ext uri="{FF2B5EF4-FFF2-40B4-BE49-F238E27FC236}">
+                <a16:creationId xmlns:a16="http://schemas.microsoft.com/office/drawing/2014/main" id="{708943DC-0A81-0545-963E-CA3340C5E4A0}"/>
+              </a:ext>
+            </a:extLst>
+          </p:cNvPr>
+          <p:cNvPicPr>
+            <a:picLocks noChangeAspect="1"/>
+          </p:cNvPicPr>
+          <p:nvPr/>
+        </p:nvPicPr>
+        <p:blipFill>
+          <a:blip r:embed="rId2"/>
+          <a:stretch>
+            <a:fillRect/>
+          </a:stretch>
+        </p:blipFill>
+        <p:spPr>
+          <a:xfrm>
+            <a:off x="7299657" y="1351128"/>
+            <a:ext cx="4155743" cy="4155743"/>
+          </a:xfrm>
+          <a:prstGeom prst="rect">
+            <a:avLst/>
+          </a:prstGeom>
+        </p:spPr>
+      </p:pic>
     </p:spTree>
     <p:extLst>
       <p:ext uri="{BB962C8B-B14F-4D97-AF65-F5344CB8AC3E}">
@@ -25766,7 +25796,7 @@
             </a:pPr>
             <a:r>
               <a:rPr lang="en-US" sz="2800" dirty="0"/>
-              <a:t>There are tons of different ideas that I could have decided on for this project. I wanted to make a text game as it would be an interesting and fun way to tie in all of the python functions that we have used in this module.</a:t>
+              <a:t>I decided on a text game as it would be a fun and interesting way to tie all of the concepts that we have learned so far together.</a:t>
             </a:r>
           </a:p>
         </p:txBody>
@@ -26237,12 +26267,21 @@
           <a:bodyPr/>
           <a:lstStyle/>
           <a:p>
-            <a:pPr marL="0" indent="0">
-              <a:buNone/>
-            </a:pPr>
             <a:r>
               <a:rPr lang="en-US" sz="2800" dirty="0"/>
-              <a:t>If I could go back and change something about this project, I would probably add more things that the player could do instead of just attack the monster. An example of this could be collecting items. I would also work to make the code more efficient by using classes or more modular functions.</a:t>
+              <a:t>Organization of Code</a:t>
+            </a:r>
+          </a:p>
+          <a:p>
+            <a:r>
+              <a:rPr lang="en-US" sz="2800" dirty="0"/>
+              <a:t>More features such as items, or skill-based attacks.</a:t>
+            </a:r>
+          </a:p>
+          <a:p>
+            <a:r>
+              <a:rPr lang="en-US" sz="2800" dirty="0"/>
+              <a:t>Improve story.</a:t>
             </a:r>
           </a:p>
         </p:txBody>
@@ -26358,7 +26397,7 @@
           <a:p>
             <a:r>
               <a:rPr lang="en-US" sz="3600" dirty="0"/>
-              <a:t>Function Usage</a:t>
+              <a:t>Usage of Functions</a:t>
             </a:r>
           </a:p>
           <a:p>
@@ -27174,20 +27213,20 @@
 </file>
 
 <file path=customXml/item1.xml><?xml version="1.0" encoding="utf-8"?>
-<p:properties xmlns:p="http://schemas.microsoft.com/office/2006/metadata/properties" xmlns:xsi="http://www.w3.org/2001/XMLSchema-instance" xmlns:pc="http://schemas.microsoft.com/office/infopath/2007/PartnerControls">
-  <documentManagement>
-    <MediaServiceKeyPoints xmlns="71af3243-3dd4-4a8d-8c0d-dd76da1f02a5" xsi:nil="true"/>
-  </documentManagement>
-</p:properties>
-</file>
-
-<file path=customXml/item2.xml><?xml version="1.0" encoding="utf-8"?>
 <?mso-contentType ?>
 <FormTemplates xmlns="http://schemas.microsoft.com/sharepoint/v3/contenttype/forms">
   <Display>DocumentLibraryForm</Display>
   <Edit>DocumentLibraryForm</Edit>
   <New>DocumentLibraryForm</New>
 </FormTemplates>
+</file>
+
+<file path=customXml/item2.xml><?xml version="1.0" encoding="utf-8"?>
+<p:properties xmlns:p="http://schemas.microsoft.com/office/2006/metadata/properties" xmlns:xsi="http://www.w3.org/2001/XMLSchema-instance" xmlns:pc="http://schemas.microsoft.com/office/infopath/2007/PartnerControls">
+  <documentManagement>
+    <MediaServiceKeyPoints xmlns="71af3243-3dd4-4a8d-8c0d-dd76da1f02a5" xsi:nil="true"/>
+  </documentManagement>
+</p:properties>
 </file>
 
 <file path=customXml/item3.xml><?xml version="1.0" encoding="utf-8"?>
@@ -27402,19 +27441,19 @@
 </file>
 
 <file path=customXml/itemProps1.xml><?xml version="1.0" encoding="utf-8"?>
+<ds:datastoreItem xmlns:ds="http://schemas.openxmlformats.org/officeDocument/2006/customXml" ds:itemID="{5B26E0C9-B2AA-42E6-97B6-E1B7D9EAF129}">
+  <ds:schemaRefs>
+    <ds:schemaRef ds:uri="http://schemas.microsoft.com/sharepoint/v3/contenttype/forms"/>
+  </ds:schemaRefs>
+</ds:datastoreItem>
+</file>
+
+<file path=customXml/itemProps2.xml><?xml version="1.0" encoding="utf-8"?>
 <ds:datastoreItem xmlns:ds="http://schemas.openxmlformats.org/officeDocument/2006/customXml" ds:itemID="{F5757914-1161-4661-9696-421FD6935CDD}">
   <ds:schemaRefs>
     <ds:schemaRef ds:uri="http://schemas.microsoft.com/office/2006/metadata/properties"/>
     <ds:schemaRef ds:uri="http://schemas.microsoft.com/office/infopath/2007/PartnerControls"/>
     <ds:schemaRef ds:uri="71af3243-3dd4-4a8d-8c0d-dd76da1f02a5"/>
-  </ds:schemaRefs>
-</ds:datastoreItem>
-</file>
-
-<file path=customXml/itemProps2.xml><?xml version="1.0" encoding="utf-8"?>
-<ds:datastoreItem xmlns:ds="http://schemas.openxmlformats.org/officeDocument/2006/customXml" ds:itemID="{5B26E0C9-B2AA-42E6-97B6-E1B7D9EAF129}">
-  <ds:schemaRefs>
-    <ds:schemaRef ds:uri="http://schemas.microsoft.com/sharepoint/v3/contenttype/forms"/>
   </ds:schemaRefs>
 </ds:datastoreItem>
 </file>

</xml_diff>